<commit_message>
Update Homework 3_Yevhenii Urbanas.pptx
</commit_message>
<xml_diff>
--- a/Homework 3_Yevhenii Urbanas.pptx
+++ b/Homework 3_Yevhenii Urbanas.pptx
@@ -8,6 +8,8 @@
     <p:sldId id="256" r:id="rId2"/>
     <p:sldId id="257" r:id="rId3"/>
     <p:sldId id="258" r:id="rId4"/>
+    <p:sldId id="259" r:id="rId5"/>
+    <p:sldId id="260" r:id="rId6"/>
   </p:sldIdLst>
   <p:sldSz cx="12192000" cy="6858000"/>
   <p:notesSz cx="6858000" cy="9144000"/>
@@ -106,6 +108,11 @@
       </a:defRPr>
     </a:lvl9pPr>
   </p:defaultTextStyle>
+  <p:extLst>
+    <p:ext uri="{EFAFB233-063F-42B5-8137-9DF3F51BA10A}">
+      <p15:sldGuideLst xmlns:p15="http://schemas.microsoft.com/office/powerpoint/2012/main"/>
+    </p:ext>
+  </p:extLst>
 </p:presentation>
 </file>
 
@@ -3533,12 +3540,68 @@
           <a:chExt cx="0" cy="0"/>
         </a:xfrm>
       </p:grpSpPr>
+      <p:sp>
+        <p:nvSpPr>
+          <p:cNvPr id="3" name="TextBox 2">
+            <a:extLst>
+              <a:ext uri="{FF2B5EF4-FFF2-40B4-BE49-F238E27FC236}">
+                <a16:creationId xmlns:a16="http://schemas.microsoft.com/office/drawing/2014/main" id="{C81ABD34-4B96-647D-C649-6496D679A902}"/>
+              </a:ext>
+            </a:extLst>
+          </p:cNvPr>
+          <p:cNvSpPr txBox="1"/>
+          <p:nvPr/>
+        </p:nvSpPr>
+        <p:spPr>
+          <a:xfrm>
+            <a:off x="1219200" y="321733"/>
+            <a:ext cx="6612579" cy="369332"/>
+          </a:xfrm>
+          <a:prstGeom prst="rect">
+            <a:avLst/>
+          </a:prstGeom>
+          <a:noFill/>
+        </p:spPr>
+        <p:txBody>
+          <a:bodyPr wrap="none" rtlCol="0">
+            <a:spAutoFit/>
+          </a:bodyPr>
+          <a:lstStyle/>
+          <a:p>
+            <a:r>
+              <a:rPr lang="uk-UA" dirty="0"/>
+              <a:t>Додав файли через аналог </a:t>
+            </a:r>
+            <a:r>
+              <a:rPr lang="en-UA" dirty="0"/>
+              <a:t>SourceTree</a:t>
+            </a:r>
+            <a:r>
+              <a:rPr lang="uk-UA" dirty="0"/>
+              <a:t>, </a:t>
+            </a:r>
+            <a:r>
+              <a:rPr lang="uk-UA" dirty="0" err="1"/>
+              <a:t>закомітив</a:t>
+            </a:r>
+            <a:r>
+              <a:rPr lang="uk-UA" dirty="0"/>
+              <a:t> та запушив в </a:t>
+            </a:r>
+            <a:r>
+              <a:rPr lang="en-US" dirty="0"/>
+              <a:t>Git</a:t>
+            </a:r>
+            <a:endParaRPr lang="en-UA" dirty="0"/>
+          </a:p>
+        </p:txBody>
+      </p:sp>
       <p:pic>
         <p:nvPicPr>
-          <p:cNvPr id="2" name="Picture 1">
-            <a:extLst>
-              <a:ext uri="{FF2B5EF4-FFF2-40B4-BE49-F238E27FC236}">
-                <a16:creationId xmlns:a16="http://schemas.microsoft.com/office/drawing/2014/main" id="{C7751204-ECA9-464F-528D-DA84B160A5BE}"/>
+          <p:cNvPr id="4" name="Picture 3">
+            <a:extLst>
+              <a:ext uri="{FF2B5EF4-FFF2-40B4-BE49-F238E27FC236}">
+                <a16:creationId xmlns:a16="http://schemas.microsoft.com/office/drawing/2014/main" id="{9CF5D3FE-5034-FABC-F8F7-5979B5868F57}"/>
               </a:ext>
             </a:extLst>
           </p:cNvPr>
@@ -3555,14 +3618,44 @@
         </p:blipFill>
         <p:spPr>
           <a:xfrm>
-            <a:off x="2209800" y="1007911"/>
-            <a:ext cx="7772400" cy="4842178"/>
+            <a:off x="2209800" y="1640636"/>
+            <a:ext cx="7772400" cy="3576728"/>
           </a:xfrm>
           <a:prstGeom prst="rect">
             <a:avLst/>
           </a:prstGeom>
         </p:spPr>
       </p:pic>
+    </p:spTree>
+    <p:extLst>
+      <p:ext uri="{BB962C8B-B14F-4D97-AF65-F5344CB8AC3E}">
+        <p14:creationId xmlns:p14="http://schemas.microsoft.com/office/powerpoint/2010/main" val="4248991500"/>
+      </p:ext>
+    </p:extLst>
+  </p:cSld>
+  <p:clrMapOvr>
+    <a:masterClrMapping/>
+  </p:clrMapOvr>
+</p:sld>
+</file>
+
+<file path=ppt/slides/slide4.xml><?xml version="1.0" encoding="utf-8"?>
+<p:sld xmlns:a="http://schemas.openxmlformats.org/drawingml/2006/main" xmlns:r="http://schemas.openxmlformats.org/officeDocument/2006/relationships" xmlns:p="http://schemas.openxmlformats.org/presentationml/2006/main">
+  <p:cSld>
+    <p:spTree>
+      <p:nvGrpSpPr>
+        <p:cNvPr id="1" name=""/>
+        <p:cNvGrpSpPr/>
+        <p:nvPr/>
+      </p:nvGrpSpPr>
+      <p:grpSpPr>
+        <a:xfrm>
+          <a:off x="0" y="0"/>
+          <a:ext cx="0" cy="0"/>
+          <a:chOff x="0" y="0"/>
+          <a:chExt cx="0" cy="0"/>
+        </a:xfrm>
+      </p:grpSpPr>
       <p:sp>
         <p:nvSpPr>
           <p:cNvPr id="3" name="TextBox 2">
@@ -3578,7 +3671,7 @@
         <p:spPr>
           <a:xfrm>
             <a:off x="1219200" y="321733"/>
-            <a:ext cx="6660541" cy="369332"/>
+            <a:ext cx="2408480" cy="369332"/>
           </a:xfrm>
           <a:prstGeom prst="rect">
             <a:avLst/>
@@ -3592,24 +3685,162 @@
           <a:lstStyle/>
           <a:p>
             <a:r>
-              <a:rPr lang="uk-UA" dirty="0" err="1"/>
-              <a:t>Проєкт</a:t>
-            </a:r>
-            <a:r>
               <a:rPr lang="uk-UA" dirty="0"/>
-              <a:t> створено і завантажено локально через аналог </a:t>
-            </a:r>
-            <a:r>
-              <a:rPr lang="en-UA" dirty="0"/>
-              <a:t>SourceTree</a:t>
-            </a:r>
-          </a:p>
-        </p:txBody>
-      </p:sp>
+              <a:t>Створив гілку </a:t>
+            </a:r>
+            <a:r>
+              <a:rPr lang="en-US" dirty="0"/>
+              <a:t>Dev</a:t>
+            </a:r>
+            <a:r>
+              <a:rPr lang="uk-UA" dirty="0"/>
+              <a:t> в </a:t>
+            </a:r>
+            <a:r>
+              <a:rPr lang="en-US" dirty="0"/>
+              <a:t>Git</a:t>
+            </a:r>
+            <a:endParaRPr lang="en-UA" dirty="0"/>
+          </a:p>
+        </p:txBody>
+      </p:sp>
+      <p:pic>
+        <p:nvPicPr>
+          <p:cNvPr id="2" name="Picture 1">
+            <a:extLst>
+              <a:ext uri="{FF2B5EF4-FFF2-40B4-BE49-F238E27FC236}">
+                <a16:creationId xmlns:a16="http://schemas.microsoft.com/office/drawing/2014/main" id="{A5F8D94C-4491-41C5-0461-09669BDA93C6}"/>
+              </a:ext>
+            </a:extLst>
+          </p:cNvPr>
+          <p:cNvPicPr>
+            <a:picLocks noChangeAspect="1"/>
+          </p:cNvPicPr>
+          <p:nvPr/>
+        </p:nvPicPr>
+        <p:blipFill>
+          <a:blip r:embed="rId2"/>
+          <a:stretch>
+            <a:fillRect/>
+          </a:stretch>
+        </p:blipFill>
+        <p:spPr>
+          <a:xfrm>
+            <a:off x="2209800" y="2271156"/>
+            <a:ext cx="7772400" cy="2315688"/>
+          </a:xfrm>
+          <a:prstGeom prst="rect">
+            <a:avLst/>
+          </a:prstGeom>
+        </p:spPr>
+      </p:pic>
     </p:spTree>
     <p:extLst>
       <p:ext uri="{BB962C8B-B14F-4D97-AF65-F5344CB8AC3E}">
-        <p14:creationId xmlns:p14="http://schemas.microsoft.com/office/powerpoint/2010/main" val="4248991500"/>
+        <p14:creationId xmlns:p14="http://schemas.microsoft.com/office/powerpoint/2010/main" val="4085327536"/>
+      </p:ext>
+    </p:extLst>
+  </p:cSld>
+  <p:clrMapOvr>
+    <a:masterClrMapping/>
+  </p:clrMapOvr>
+</p:sld>
+</file>
+
+<file path=ppt/slides/slide5.xml><?xml version="1.0" encoding="utf-8"?>
+<p:sld xmlns:a="http://schemas.openxmlformats.org/drawingml/2006/main" xmlns:r="http://schemas.openxmlformats.org/officeDocument/2006/relationships" xmlns:p="http://schemas.openxmlformats.org/presentationml/2006/main">
+  <p:cSld>
+    <p:spTree>
+      <p:nvGrpSpPr>
+        <p:cNvPr id="1" name=""/>
+        <p:cNvGrpSpPr/>
+        <p:nvPr/>
+      </p:nvGrpSpPr>
+      <p:grpSpPr>
+        <a:xfrm>
+          <a:off x="0" y="0"/>
+          <a:ext cx="0" cy="0"/>
+          <a:chOff x="0" y="0"/>
+          <a:chExt cx="0" cy="0"/>
+        </a:xfrm>
+      </p:grpSpPr>
+      <p:sp>
+        <p:nvSpPr>
+          <p:cNvPr id="3" name="TextBox 2">
+            <a:extLst>
+              <a:ext uri="{FF2B5EF4-FFF2-40B4-BE49-F238E27FC236}">
+                <a16:creationId xmlns:a16="http://schemas.microsoft.com/office/drawing/2014/main" id="{C81ABD34-4B96-647D-C649-6496D679A902}"/>
+              </a:ext>
+            </a:extLst>
+          </p:cNvPr>
+          <p:cNvSpPr txBox="1"/>
+          <p:nvPr/>
+        </p:nvSpPr>
+        <p:spPr>
+          <a:xfrm>
+            <a:off x="1219200" y="321733"/>
+            <a:ext cx="3232680" cy="369332"/>
+          </a:xfrm>
+          <a:prstGeom prst="rect">
+            <a:avLst/>
+          </a:prstGeom>
+          <a:noFill/>
+        </p:spPr>
+        <p:txBody>
+          <a:bodyPr wrap="none" rtlCol="0">
+            <a:spAutoFit/>
+          </a:bodyPr>
+          <a:lstStyle/>
+          <a:p>
+            <a:r>
+              <a:rPr lang="en-US" dirty="0"/>
+              <a:t>Fetch </a:t>
+            </a:r>
+            <a:r>
+              <a:rPr lang="uk-UA" dirty="0"/>
+              <a:t>через аналог </a:t>
+            </a:r>
+            <a:r>
+              <a:rPr lang="en-UA" dirty="0"/>
+              <a:t>SourceTree</a:t>
+            </a:r>
+          </a:p>
+        </p:txBody>
+      </p:sp>
+      <p:pic>
+        <p:nvPicPr>
+          <p:cNvPr id="2" name="Picture 1">
+            <a:extLst>
+              <a:ext uri="{FF2B5EF4-FFF2-40B4-BE49-F238E27FC236}">
+                <a16:creationId xmlns:a16="http://schemas.microsoft.com/office/drawing/2014/main" id="{6EB138D1-CB62-BEC1-E000-44E97A71B251}"/>
+              </a:ext>
+            </a:extLst>
+          </p:cNvPr>
+          <p:cNvPicPr>
+            <a:picLocks noChangeAspect="1"/>
+          </p:cNvPicPr>
+          <p:nvPr/>
+        </p:nvPicPr>
+        <p:blipFill>
+          <a:blip r:embed="rId2"/>
+          <a:stretch>
+            <a:fillRect/>
+          </a:stretch>
+        </p:blipFill>
+        <p:spPr>
+          <a:xfrm>
+            <a:off x="2209800" y="1884209"/>
+            <a:ext cx="7772400" cy="3089582"/>
+          </a:xfrm>
+          <a:prstGeom prst="rect">
+            <a:avLst/>
+          </a:prstGeom>
+        </p:spPr>
+      </p:pic>
+    </p:spTree>
+    <p:extLst>
+      <p:ext uri="{BB962C8B-B14F-4D97-AF65-F5344CB8AC3E}">
+        <p14:creationId xmlns:p14="http://schemas.microsoft.com/office/powerpoint/2010/main" val="69712538"/>
       </p:ext>
     </p:extLst>
   </p:cSld>

</xml_diff>